<commit_message>
Actualización de dpcumentos, Semana 4
</commit_message>
<xml_diff>
--- a/Iteración II/Presentacion semana III 05 de Julio.pptx
+++ b/Iteración II/Presentacion semana III 05 de Julio.pptx
@@ -301,7 +301,7 @@
             <a:fld id="{B61BEF0D-F0BB-DE4B-95CE-6DB70DBA9567}" type="datetimeFigureOut">
               <a:rPr lang="en-US" dirty="0"/>
               <a:pPr/>
-              <a:t>9/4/2013</a:t>
+              <a:t>9/5/2013</a:t>
             </a:fld>
             <a:endParaRPr lang="en-US" dirty="0"/>
           </a:p>
@@ -636,7 +636,7 @@
             <a:fld id="{B61BEF0D-F0BB-DE4B-95CE-6DB70DBA9567}" type="datetimeFigureOut">
               <a:rPr lang="en-US" dirty="0"/>
               <a:pPr/>
-              <a:t>9/4/2013</a:t>
+              <a:t>9/5/2013</a:t>
             </a:fld>
             <a:endParaRPr lang="en-US" dirty="0"/>
           </a:p>
@@ -1034,7 +1034,7 @@
             <a:fld id="{B61BEF0D-F0BB-DE4B-95CE-6DB70DBA9567}" type="datetimeFigureOut">
               <a:rPr lang="en-US" dirty="0"/>
               <a:pPr/>
-              <a:t>9/4/2013</a:t>
+              <a:t>9/5/2013</a:t>
             </a:fld>
             <a:endParaRPr lang="en-US" dirty="0"/>
           </a:p>
@@ -1367,7 +1367,7 @@
             <a:fld id="{B61BEF0D-F0BB-DE4B-95CE-6DB70DBA9567}" type="datetimeFigureOut">
               <a:rPr lang="en-US" dirty="0"/>
               <a:pPr/>
-              <a:t>9/4/2013</a:t>
+              <a:t>9/5/2013</a:t>
             </a:fld>
             <a:endParaRPr lang="en-US" dirty="0"/>
           </a:p>
@@ -1684,7 +1684,7 @@
             <a:fld id="{B61BEF0D-F0BB-DE4B-95CE-6DB70DBA9567}" type="datetimeFigureOut">
               <a:rPr lang="en-US" dirty="0"/>
               <a:pPr/>
-              <a:t>9/4/2013</a:t>
+              <a:t>9/5/2013</a:t>
             </a:fld>
             <a:endParaRPr lang="en-US" dirty="0"/>
           </a:p>
@@ -2077,7 +2077,7 @@
             <a:fld id="{B61BEF0D-F0BB-DE4B-95CE-6DB70DBA9567}" type="datetimeFigureOut">
               <a:rPr lang="en-US" dirty="0"/>
               <a:pPr/>
-              <a:t>9/4/2013</a:t>
+              <a:t>9/5/2013</a:t>
             </a:fld>
             <a:endParaRPr lang="en-US" dirty="0"/>
           </a:p>
@@ -2331,7 +2331,7 @@
             <a:fld id="{B61BEF0D-F0BB-DE4B-95CE-6DB70DBA9567}" type="datetimeFigureOut">
               <a:rPr lang="en-US" dirty="0"/>
               <a:pPr/>
-              <a:t>9/4/2013</a:t>
+              <a:t>9/5/2013</a:t>
             </a:fld>
             <a:endParaRPr lang="en-US" dirty="0"/>
           </a:p>
@@ -2590,7 +2590,7 @@
             <a:fld id="{B61BEF0D-F0BB-DE4B-95CE-6DB70DBA9567}" type="datetimeFigureOut">
               <a:rPr lang="en-US" dirty="0"/>
               <a:pPr/>
-              <a:t>9/4/2013</a:t>
+              <a:t>9/5/2013</a:t>
             </a:fld>
             <a:endParaRPr lang="en-US" dirty="0"/>
           </a:p>
@@ -2849,7 +2849,7 @@
             <a:fld id="{B61BEF0D-F0BB-DE4B-95CE-6DB70DBA9567}" type="datetimeFigureOut">
               <a:rPr lang="en-US" dirty="0"/>
               <a:pPr/>
-              <a:t>9/4/2013</a:t>
+              <a:t>9/5/2013</a:t>
             </a:fld>
             <a:endParaRPr lang="en-US" dirty="0"/>
           </a:p>
@@ -3175,7 +3175,7 @@
             <a:fld id="{B61BEF0D-F0BB-DE4B-95CE-6DB70DBA9567}" type="datetimeFigureOut">
               <a:rPr lang="en-US" dirty="0"/>
               <a:pPr/>
-              <a:t>9/4/2013</a:t>
+              <a:t>9/5/2013</a:t>
             </a:fld>
             <a:endParaRPr lang="en-US" dirty="0"/>
           </a:p>
@@ -3495,7 +3495,7 @@
             <a:fld id="{B61BEF0D-F0BB-DE4B-95CE-6DB70DBA9567}" type="datetimeFigureOut">
               <a:rPr lang="en-US" dirty="0"/>
               <a:pPr/>
-              <a:t>9/4/2013</a:t>
+              <a:t>9/5/2013</a:t>
             </a:fld>
             <a:endParaRPr lang="en-US" dirty="0"/>
           </a:p>
@@ -3949,7 +3949,7 @@
             <a:fld id="{B61BEF0D-F0BB-DE4B-95CE-6DB70DBA9567}" type="datetimeFigureOut">
               <a:rPr lang="en-US" dirty="0"/>
               <a:pPr/>
-              <a:t>9/4/2013</a:t>
+              <a:t>9/5/2013</a:t>
             </a:fld>
             <a:endParaRPr lang="en-US" dirty="0"/>
           </a:p>
@@ -4151,7 +4151,7 @@
             <a:fld id="{B61BEF0D-F0BB-DE4B-95CE-6DB70DBA9567}" type="datetimeFigureOut">
               <a:rPr lang="en-US" dirty="0"/>
               <a:pPr/>
-              <a:t>9/4/2013</a:t>
+              <a:t>9/5/2013</a:t>
             </a:fld>
             <a:endParaRPr lang="en-US" dirty="0"/>
           </a:p>
@@ -4325,7 +4325,7 @@
             <a:fld id="{B61BEF0D-F0BB-DE4B-95CE-6DB70DBA9567}" type="datetimeFigureOut">
               <a:rPr lang="en-US" dirty="0"/>
               <a:pPr/>
-              <a:t>9/4/2013</a:t>
+              <a:t>9/5/2013</a:t>
             </a:fld>
             <a:endParaRPr lang="en-US" dirty="0"/>
           </a:p>
@@ -4655,7 +4655,7 @@
             <a:fld id="{B61BEF0D-F0BB-DE4B-95CE-6DB70DBA9567}" type="datetimeFigureOut">
               <a:rPr lang="en-US" dirty="0"/>
               <a:pPr/>
-              <a:t>9/4/2013</a:t>
+              <a:t>9/5/2013</a:t>
             </a:fld>
             <a:endParaRPr lang="en-US" dirty="0"/>
           </a:p>
@@ -4997,7 +4997,7 @@
             <a:fld id="{B61BEF0D-F0BB-DE4B-95CE-6DB70DBA9567}" type="datetimeFigureOut">
               <a:rPr lang="en-US" dirty="0"/>
               <a:pPr/>
-              <a:t>9/4/2013</a:t>
+              <a:t>9/5/2013</a:t>
             </a:fld>
             <a:endParaRPr lang="en-US" dirty="0"/>
           </a:p>
@@ -7111,7 +7111,7 @@
             <a:fld id="{B61BEF0D-F0BB-DE4B-95CE-6DB70DBA9567}" type="datetimeFigureOut">
               <a:rPr lang="en-US" dirty="0"/>
               <a:pPr/>
-              <a:t>9/4/2013</a:t>
+              <a:t>9/5/2013</a:t>
             </a:fld>
             <a:endParaRPr lang="en-US" dirty="0"/>
           </a:p>
@@ -9218,7 +9218,7 @@
           <p:nvPr>
             <p:extLst>
               <p:ext uri="{D42A27DB-BD31-4B8C-83A1-F6EECF244321}">
-                <p14:modId xmlns:p14="http://schemas.microsoft.com/office/powerpoint/2010/main" val="2168990576"/>
+                <p14:modId xmlns:p14="http://schemas.microsoft.com/office/powerpoint/2010/main" val="1749785457"/>
               </p:ext>
             </p:extLst>
           </p:nvPr>
@@ -9540,7 +9540,7 @@
                           <a:effectLst/>
                           <a:latin typeface="+mn-lt"/>
                         </a:rPr>
-                        <a:t>13</a:t>
+                        <a:t>14</a:t>
                       </a:r>
                       <a:endParaRPr lang="es-CL" sz="1050" dirty="0">
                         <a:solidFill>
@@ -9607,7 +9607,7 @@
                           <a:effectLst/>
                           <a:latin typeface="+mn-lt"/>
                         </a:rPr>
-                        <a:t>14</a:t>
+                        <a:t>15</a:t>
                       </a:r>
                       <a:endParaRPr lang="es-CL" sz="1050" dirty="0">
                         <a:solidFill>

</xml_diff>